<commit_message>
changed get_anomaly_ID.py and added data used for running the code
added grass segmentation mask, parkway/byway segmentation mask, SCT ouput, anomaly candidate list
</commit_message>
<xml_diff>
--- a/time decision/time decision functions usage.pptx
+++ b/time decision/time decision functions usage.pptx
@@ -262,7 +262,7 @@
           <a:p>
             <a:fld id="{7E97090A-7129-4A69-A956-DEAFEF1ECEFF}" type="datetimeFigureOut">
               <a:rPr lang="en-US" smtClean="0"/>
-              <a:t>5/25/2019</a:t>
+              <a:t>5/31/2019</a:t>
             </a:fld>
             <a:endParaRPr lang="en-US"/>
           </a:p>
@@ -460,7 +460,7 @@
           <a:p>
             <a:fld id="{7E97090A-7129-4A69-A956-DEAFEF1ECEFF}" type="datetimeFigureOut">
               <a:rPr lang="en-US" smtClean="0"/>
-              <a:t>5/25/2019</a:t>
+              <a:t>5/31/2019</a:t>
             </a:fld>
             <a:endParaRPr lang="en-US"/>
           </a:p>
@@ -668,7 +668,7 @@
           <a:p>
             <a:fld id="{7E97090A-7129-4A69-A956-DEAFEF1ECEFF}" type="datetimeFigureOut">
               <a:rPr lang="en-US" smtClean="0"/>
-              <a:t>5/25/2019</a:t>
+              <a:t>5/31/2019</a:t>
             </a:fld>
             <a:endParaRPr lang="en-US"/>
           </a:p>
@@ -866,7 +866,7 @@
           <a:p>
             <a:fld id="{7E97090A-7129-4A69-A956-DEAFEF1ECEFF}" type="datetimeFigureOut">
               <a:rPr lang="en-US" smtClean="0"/>
-              <a:t>5/25/2019</a:t>
+              <a:t>5/31/2019</a:t>
             </a:fld>
             <a:endParaRPr lang="en-US"/>
           </a:p>
@@ -1141,7 +1141,7 @@
           <a:p>
             <a:fld id="{7E97090A-7129-4A69-A956-DEAFEF1ECEFF}" type="datetimeFigureOut">
               <a:rPr lang="en-US" smtClean="0"/>
-              <a:t>5/25/2019</a:t>
+              <a:t>5/31/2019</a:t>
             </a:fld>
             <a:endParaRPr lang="en-US"/>
           </a:p>
@@ -1406,7 +1406,7 @@
           <a:p>
             <a:fld id="{7E97090A-7129-4A69-A956-DEAFEF1ECEFF}" type="datetimeFigureOut">
               <a:rPr lang="en-US" smtClean="0"/>
-              <a:t>5/25/2019</a:t>
+              <a:t>5/31/2019</a:t>
             </a:fld>
             <a:endParaRPr lang="en-US"/>
           </a:p>
@@ -1818,7 +1818,7 @@
           <a:p>
             <a:fld id="{7E97090A-7129-4A69-A956-DEAFEF1ECEFF}" type="datetimeFigureOut">
               <a:rPr lang="en-US" smtClean="0"/>
-              <a:t>5/25/2019</a:t>
+              <a:t>5/31/2019</a:t>
             </a:fld>
             <a:endParaRPr lang="en-US"/>
           </a:p>
@@ -1959,7 +1959,7 @@
           <a:p>
             <a:fld id="{7E97090A-7129-4A69-A956-DEAFEF1ECEFF}" type="datetimeFigureOut">
               <a:rPr lang="en-US" smtClean="0"/>
-              <a:t>5/25/2019</a:t>
+              <a:t>5/31/2019</a:t>
             </a:fld>
             <a:endParaRPr lang="en-US"/>
           </a:p>
@@ -2072,7 +2072,7 @@
           <a:p>
             <a:fld id="{7E97090A-7129-4A69-A956-DEAFEF1ECEFF}" type="datetimeFigureOut">
               <a:rPr lang="en-US" smtClean="0"/>
-              <a:t>5/25/2019</a:t>
+              <a:t>5/31/2019</a:t>
             </a:fld>
             <a:endParaRPr lang="en-US"/>
           </a:p>
@@ -2383,7 +2383,7 @@
           <a:p>
             <a:fld id="{7E97090A-7129-4A69-A956-DEAFEF1ECEFF}" type="datetimeFigureOut">
               <a:rPr lang="en-US" smtClean="0"/>
-              <a:t>5/25/2019</a:t>
+              <a:t>5/31/2019</a:t>
             </a:fld>
             <a:endParaRPr lang="en-US"/>
           </a:p>
@@ -2671,7 +2671,7 @@
           <a:p>
             <a:fld id="{7E97090A-7129-4A69-A956-DEAFEF1ECEFF}" type="datetimeFigureOut">
               <a:rPr lang="en-US" smtClean="0"/>
-              <a:t>5/25/2019</a:t>
+              <a:t>5/31/2019</a:t>
             </a:fld>
             <a:endParaRPr lang="en-US"/>
           </a:p>
@@ -2912,7 +2912,7 @@
           <a:p>
             <a:fld id="{7E97090A-7129-4A69-A956-DEAFEF1ECEFF}" type="datetimeFigureOut">
               <a:rPr lang="en-US" smtClean="0"/>
-              <a:t>5/25/2019</a:t>
+              <a:t>5/31/2019</a:t>
             </a:fld>
             <a:endParaRPr lang="en-US"/>
           </a:p>
@@ -3497,6 +3497,25 @@
             <a:pPr lvl="1"/>
             <a:r>
               <a:rPr lang="en-US" dirty="0"/>
+              <a:t>Takes path to byway/parkway segmentation mask as input</a:t>
+            </a:r>
+          </a:p>
+          <a:p>
+            <a:pPr lvl="1"/>
+            <a:r>
+              <a:rPr lang="en-US" dirty="0"/>
+              <a:t>Takes path to “</a:t>
+            </a:r>
+            <a:r>
+              <a:rPr lang="en-US"/>
+              <a:t>anomalyCandidate_processed.txt”</a:t>
+            </a:r>
+            <a:endParaRPr lang="en-US" dirty="0"/>
+          </a:p>
+          <a:p>
+            <a:pPr lvl="1"/>
+            <a:r>
+              <a:rPr lang="en-US" dirty="0"/>
               <a:t>Outputs “anomaly_candidate_ID.txt” with [video #] [part #] [ID #]</a:t>
             </a:r>
           </a:p>
@@ -3651,10 +3670,9 @@
               <a:t>anomalyStart.m</a:t>
             </a:r>
             <a:r>
-              <a:rPr lang="en-US"/>
+              <a:rPr lang="en-US" dirty="0"/>
               <a:t>”</a:t>
             </a:r>
-            <a:endParaRPr lang="en-US" dirty="0"/>
           </a:p>
           <a:p>
             <a:pPr lvl="1"/>

</xml_diff>

<commit_message>
updated code and added comments
</commit_message>
<xml_diff>
--- a/time decision/time decision functions usage.pptx
+++ b/time decision/time decision functions usage.pptx
@@ -9,6 +9,7 @@
     <p:sldId id="257" r:id="rId3"/>
     <p:sldId id="258" r:id="rId4"/>
     <p:sldId id="259" r:id="rId5"/>
+    <p:sldId id="261" r:id="rId6"/>
   </p:sldIdLst>
   <p:sldSz cx="12192000" cy="6858000"/>
   <p:notesSz cx="6858000" cy="9144000"/>
@@ -3468,7 +3469,9 @@
         </p:nvSpPr>
         <p:spPr/>
         <p:txBody>
-          <a:bodyPr/>
+          <a:bodyPr>
+            <a:normAutofit lnSpcReduction="10000"/>
+          </a:bodyPr>
           <a:lstStyle/>
           <a:p>
             <a:r>
@@ -3504,11 +3507,18 @@
             <a:pPr lvl="1"/>
             <a:r>
               <a:rPr lang="en-US" dirty="0"/>
-              <a:t>Takes path to “</a:t>
-            </a:r>
-            <a:r>
-              <a:rPr lang="en-US"/>
-              <a:t>anomalyCandidate_processed.txt”</a:t>
+              <a:t>Takes path to “anomalyCandidate_processed.txt”</a:t>
+            </a:r>
+          </a:p>
+          <a:p>
+            <a:pPr lvl="1"/>
+            <a:r>
+              <a:rPr lang="en-US" dirty="0"/>
+              <a:t>Outputs “anomalyCandidate_processed2.txt” which removes false positives with byway</a:t>
+            </a:r>
+            <a:r>
+              <a:rPr lang="en-US"/>
+              <a:t>/parkway mask</a:t>
             </a:r>
             <a:endParaRPr lang="en-US" dirty="0"/>
           </a:p>
@@ -3864,6 +3874,119 @@
     <p:extLst>
       <p:ext uri="{BB962C8B-B14F-4D97-AF65-F5344CB8AC3E}">
         <p14:creationId xmlns:p14="http://schemas.microsoft.com/office/powerpoint/2010/main" val="2773606935"/>
+      </p:ext>
+    </p:extLst>
+  </p:cSld>
+  <p:clrMapOvr>
+    <a:masterClrMapping/>
+  </p:clrMapOvr>
+</p:sld>
+</file>
+
+<file path=ppt/slides/slide5.xml><?xml version="1.0" encoding="utf-8"?>
+<p:sld xmlns:a="http://schemas.openxmlformats.org/drawingml/2006/main" xmlns:r="http://schemas.openxmlformats.org/officeDocument/2006/relationships" xmlns:p="http://schemas.openxmlformats.org/presentationml/2006/main">
+  <p:cSld>
+    <p:spTree>
+      <p:nvGrpSpPr>
+        <p:cNvPr id="1" name=""/>
+        <p:cNvGrpSpPr/>
+        <p:nvPr/>
+      </p:nvGrpSpPr>
+      <p:grpSpPr>
+        <a:xfrm>
+          <a:off x="0" y="0"/>
+          <a:ext cx="0" cy="0"/>
+          <a:chOff x="0" y="0"/>
+          <a:chExt cx="0" cy="0"/>
+        </a:xfrm>
+      </p:grpSpPr>
+      <p:sp>
+        <p:nvSpPr>
+          <p:cNvPr id="2" name="Title 1">
+            <a:extLst>
+              <a:ext uri="{FF2B5EF4-FFF2-40B4-BE49-F238E27FC236}">
+                <a16:creationId xmlns:a16="http://schemas.microsoft.com/office/drawing/2014/main" id="{146B3056-8CEF-4C67-AAC3-3CEBE998756E}"/>
+              </a:ext>
+            </a:extLst>
+          </p:cNvPr>
+          <p:cNvSpPr>
+            <a:spLocks noGrp="1"/>
+          </p:cNvSpPr>
+          <p:nvPr>
+            <p:ph type="title"/>
+          </p:nvPr>
+        </p:nvSpPr>
+        <p:spPr/>
+        <p:txBody>
+          <a:bodyPr/>
+          <a:lstStyle/>
+          <a:p>
+            <a:r>
+              <a:rPr lang="en-US" dirty="0"/>
+              <a:t>Anomaly Start Time Estimation</a:t>
+            </a:r>
+          </a:p>
+        </p:txBody>
+      </p:sp>
+      <p:sp>
+        <p:nvSpPr>
+          <p:cNvPr id="3" name="Content Placeholder 2">
+            <a:extLst>
+              <a:ext uri="{FF2B5EF4-FFF2-40B4-BE49-F238E27FC236}">
+                <a16:creationId xmlns:a16="http://schemas.microsoft.com/office/drawing/2014/main" id="{5B8A65C6-F14B-405B-A783-4A949A2D5C90}"/>
+              </a:ext>
+            </a:extLst>
+          </p:cNvPr>
+          <p:cNvSpPr>
+            <a:spLocks noGrp="1"/>
+          </p:cNvSpPr>
+          <p:nvPr>
+            <p:ph idx="1"/>
+          </p:nvPr>
+        </p:nvSpPr>
+        <p:spPr/>
+        <p:txBody>
+          <a:bodyPr/>
+          <a:lstStyle/>
+          <a:p>
+            <a:r>
+              <a:rPr lang="en-US" dirty="0"/>
+              <a:t>Gets anomaly start time with “get_start_time.py”</a:t>
+            </a:r>
+          </a:p>
+          <a:p>
+            <a:pPr lvl="1"/>
+            <a:r>
+              <a:rPr lang="en-US" dirty="0"/>
+              <a:t>Takes “anomaly_candidates_processed2.txt”, “enter_grass_time.txt”, and “stop_time.txt”</a:t>
+            </a:r>
+          </a:p>
+          <a:p>
+            <a:pPr lvl="1"/>
+            <a:r>
+              <a:rPr lang="en-US" dirty="0"/>
+              <a:t>Outputs “</a:t>
+            </a:r>
+            <a:r>
+              <a:rPr lang="en-US" dirty="0" err="1"/>
+              <a:t>anomaly_start_</a:t>
+            </a:r>
+            <a:r>
+              <a:rPr lang="en-US" err="1"/>
+              <a:t>time</a:t>
+            </a:r>
+            <a:r>
+              <a:rPr lang="en-US"/>
+              <a:t>.txt”</a:t>
+            </a:r>
+            <a:endParaRPr lang="en-US" dirty="0"/>
+          </a:p>
+        </p:txBody>
+      </p:sp>
+    </p:spTree>
+    <p:extLst>
+      <p:ext uri="{BB962C8B-B14F-4D97-AF65-F5344CB8AC3E}">
+        <p14:creationId xmlns:p14="http://schemas.microsoft.com/office/powerpoint/2010/main" val="2588191033"/>
       </p:ext>
     </p:extLst>
   </p:cSld>

</xml_diff>